<commit_message>
added timings to slide comments
</commit_message>
<xml_diff>
--- a/Y13/Assembly/Assembly Language.pptx
+++ b/Y13/Assembly/Assembly Language.pptx
@@ -319,6 +319,11 @@
       </a:defRPr>
     </a:lvl9pPr>
   </p:defaultTextStyle>
+  <p:extLst>
+    <p:ext uri="{EFAFB233-063F-42B5-8137-9DF3F51BA10A}">
+      <p15:sldGuideLst xmlns:p15="http://schemas.microsoft.com/office/powerpoint/2012/main"/>
+    </p:ext>
+  </p:extLst>
 </p:presentation>
 </file>
 
@@ -524,6 +529,282 @@
       </p:grpSpPr>
       <p:sp>
         <p:nvSpPr>
+          <p:cNvPr id="2" name="Slide Image Placeholder 1"/>
+          <p:cNvSpPr>
+            <a:spLocks noGrp="1" noRot="1" noChangeAspect="1"/>
+          </p:cNvSpPr>
+          <p:nvPr>
+            <p:ph type="sldImg"/>
+          </p:nvPr>
+        </p:nvSpPr>
+        <p:spPr>
+          <a:xfrm>
+            <a:off x="381000" y="685800"/>
+            <a:ext cx="6096000" cy="3429000"/>
+          </a:xfrm>
+        </p:spPr>
+      </p:sp>
+      <p:sp>
+        <p:nvSpPr>
+          <p:cNvPr id="3" name="Notes Placeholder 2"/>
+          <p:cNvSpPr>
+            <a:spLocks noGrp="1"/>
+          </p:cNvSpPr>
+          <p:nvPr>
+            <p:ph type="body" idx="1"/>
+          </p:nvPr>
+        </p:nvSpPr>
+        <p:spPr/>
+        <p:txBody>
+          <a:bodyPr/>
+          <a:lstStyle/>
+          <a:p>
+            <a:r>
+              <a:rPr lang="en-US" dirty="0"/>
+              <a:t>10:55</a:t>
+            </a:r>
+          </a:p>
+        </p:txBody>
+      </p:sp>
+    </p:spTree>
+    <p:extLst>
+      <p:ext uri="{BB962C8B-B14F-4D97-AF65-F5344CB8AC3E}">
+        <p14:creationId xmlns:p14="http://schemas.microsoft.com/office/powerpoint/2010/main" val="100140365"/>
+      </p:ext>
+    </p:extLst>
+  </p:cSld>
+  <p:clrMapOvr>
+    <a:masterClrMapping/>
+  </p:clrMapOvr>
+</p:notes>
+</file>
+
+<file path=ppt/notesSlides/notesSlide10.xml><?xml version="1.0" encoding="utf-8"?>
+<p:notes xmlns:a="http://schemas.openxmlformats.org/drawingml/2006/main" xmlns:r="http://schemas.openxmlformats.org/officeDocument/2006/relationships" xmlns:p="http://schemas.openxmlformats.org/presentationml/2006/main">
+  <p:cSld>
+    <p:spTree>
+      <p:nvGrpSpPr>
+        <p:cNvPr id="1" name=""/>
+        <p:cNvGrpSpPr/>
+        <p:nvPr/>
+      </p:nvGrpSpPr>
+      <p:grpSpPr>
+        <a:xfrm>
+          <a:off x="0" y="0"/>
+          <a:ext cx="0" cy="0"/>
+          <a:chOff x="0" y="0"/>
+          <a:chExt cx="0" cy="0"/>
+        </a:xfrm>
+      </p:grpSpPr>
+      <p:sp>
+        <p:nvSpPr>
+          <p:cNvPr id="2" name="Slide Image Placeholder 1"/>
+          <p:cNvSpPr>
+            <a:spLocks noGrp="1" noRot="1" noChangeAspect="1"/>
+          </p:cNvSpPr>
+          <p:nvPr>
+            <p:ph type="sldImg"/>
+          </p:nvPr>
+        </p:nvSpPr>
+        <p:spPr>
+          <a:xfrm>
+            <a:off x="381000" y="685800"/>
+            <a:ext cx="6096000" cy="3429000"/>
+          </a:xfrm>
+        </p:spPr>
+      </p:sp>
+      <p:sp>
+        <p:nvSpPr>
+          <p:cNvPr id="3" name="Notes Placeholder 2"/>
+          <p:cNvSpPr>
+            <a:spLocks noGrp="1"/>
+          </p:cNvSpPr>
+          <p:nvPr>
+            <p:ph type="body" idx="1"/>
+          </p:nvPr>
+        </p:nvSpPr>
+        <p:spPr/>
+        <p:txBody>
+          <a:bodyPr/>
+          <a:lstStyle/>
+          <a:p>
+            <a:r>
+              <a:rPr lang="en-US" dirty="0"/>
+              <a:t>End: 11:45</a:t>
+            </a:r>
+          </a:p>
+        </p:txBody>
+      </p:sp>
+    </p:spTree>
+    <p:extLst>
+      <p:ext uri="{BB962C8B-B14F-4D97-AF65-F5344CB8AC3E}">
+        <p14:creationId xmlns:p14="http://schemas.microsoft.com/office/powerpoint/2010/main" val="4116613772"/>
+      </p:ext>
+    </p:extLst>
+  </p:cSld>
+  <p:clrMapOvr>
+    <a:masterClrMapping/>
+  </p:clrMapOvr>
+</p:notes>
+</file>
+
+<file path=ppt/notesSlides/notesSlide2.xml><?xml version="1.0" encoding="utf-8"?>
+<p:notes xmlns:a="http://schemas.openxmlformats.org/drawingml/2006/main" xmlns:r="http://schemas.openxmlformats.org/officeDocument/2006/relationships" xmlns:p="http://schemas.openxmlformats.org/presentationml/2006/main">
+  <p:cSld>
+    <p:spTree>
+      <p:nvGrpSpPr>
+        <p:cNvPr id="1" name=""/>
+        <p:cNvGrpSpPr/>
+        <p:nvPr/>
+      </p:nvGrpSpPr>
+      <p:grpSpPr>
+        <a:xfrm>
+          <a:off x="0" y="0"/>
+          <a:ext cx="0" cy="0"/>
+          <a:chOff x="0" y="0"/>
+          <a:chExt cx="0" cy="0"/>
+        </a:xfrm>
+      </p:grpSpPr>
+      <p:sp>
+        <p:nvSpPr>
+          <p:cNvPr id="2" name="Slide Image Placeholder 1"/>
+          <p:cNvSpPr>
+            <a:spLocks noGrp="1" noRot="1" noChangeAspect="1"/>
+          </p:cNvSpPr>
+          <p:nvPr>
+            <p:ph type="sldImg"/>
+          </p:nvPr>
+        </p:nvSpPr>
+        <p:spPr>
+          <a:xfrm>
+            <a:off x="381000" y="685800"/>
+            <a:ext cx="6096000" cy="3429000"/>
+          </a:xfrm>
+        </p:spPr>
+      </p:sp>
+      <p:sp>
+        <p:nvSpPr>
+          <p:cNvPr id="3" name="Notes Placeholder 2"/>
+          <p:cNvSpPr>
+            <a:spLocks noGrp="1"/>
+          </p:cNvSpPr>
+          <p:nvPr>
+            <p:ph type="body" idx="1"/>
+          </p:nvPr>
+        </p:nvSpPr>
+        <p:spPr/>
+        <p:txBody>
+          <a:bodyPr/>
+          <a:lstStyle/>
+          <a:p>
+            <a:r>
+              <a:rPr lang="en-US" dirty="0"/>
+              <a:t>End – 11:00</a:t>
+            </a:r>
+          </a:p>
+        </p:txBody>
+      </p:sp>
+    </p:spTree>
+    <p:extLst>
+      <p:ext uri="{BB962C8B-B14F-4D97-AF65-F5344CB8AC3E}">
+        <p14:creationId xmlns:p14="http://schemas.microsoft.com/office/powerpoint/2010/main" val="1406349690"/>
+      </p:ext>
+    </p:extLst>
+  </p:cSld>
+  <p:clrMapOvr>
+    <a:masterClrMapping/>
+  </p:clrMapOvr>
+</p:notes>
+</file>
+
+<file path=ppt/notesSlides/notesSlide3.xml><?xml version="1.0" encoding="utf-8"?>
+<p:notes xmlns:a="http://schemas.openxmlformats.org/drawingml/2006/main" xmlns:r="http://schemas.openxmlformats.org/officeDocument/2006/relationships" xmlns:p="http://schemas.openxmlformats.org/presentationml/2006/main">
+  <p:cSld>
+    <p:spTree>
+      <p:nvGrpSpPr>
+        <p:cNvPr id="1" name=""/>
+        <p:cNvGrpSpPr/>
+        <p:nvPr/>
+      </p:nvGrpSpPr>
+      <p:grpSpPr>
+        <a:xfrm>
+          <a:off x="0" y="0"/>
+          <a:ext cx="0" cy="0"/>
+          <a:chOff x="0" y="0"/>
+          <a:chExt cx="0" cy="0"/>
+        </a:xfrm>
+      </p:grpSpPr>
+      <p:sp>
+        <p:nvSpPr>
+          <p:cNvPr id="2" name="Slide Image Placeholder 1"/>
+          <p:cNvSpPr>
+            <a:spLocks noGrp="1" noRot="1" noChangeAspect="1"/>
+          </p:cNvSpPr>
+          <p:nvPr>
+            <p:ph type="sldImg"/>
+          </p:nvPr>
+        </p:nvSpPr>
+        <p:spPr>
+          <a:xfrm>
+            <a:off x="381000" y="685800"/>
+            <a:ext cx="6096000" cy="3429000"/>
+          </a:xfrm>
+        </p:spPr>
+      </p:sp>
+      <p:sp>
+        <p:nvSpPr>
+          <p:cNvPr id="3" name="Notes Placeholder 2"/>
+          <p:cNvSpPr>
+            <a:spLocks noGrp="1"/>
+          </p:cNvSpPr>
+          <p:nvPr>
+            <p:ph type="body" idx="1"/>
+          </p:nvPr>
+        </p:nvSpPr>
+        <p:spPr/>
+        <p:txBody>
+          <a:bodyPr/>
+          <a:lstStyle/>
+          <a:p>
+            <a:r>
+              <a:rPr lang="en-US" dirty="0"/>
+              <a:t>End – 11:00</a:t>
+            </a:r>
+          </a:p>
+        </p:txBody>
+      </p:sp>
+    </p:spTree>
+    <p:extLst>
+      <p:ext uri="{BB962C8B-B14F-4D97-AF65-F5344CB8AC3E}">
+        <p14:creationId xmlns:p14="http://schemas.microsoft.com/office/powerpoint/2010/main" val="2842074938"/>
+      </p:ext>
+    </p:extLst>
+  </p:cSld>
+  <p:clrMapOvr>
+    <a:masterClrMapping/>
+  </p:clrMapOvr>
+</p:notes>
+</file>
+
+<file path=ppt/notesSlides/notesSlide4.xml><?xml version="1.0" encoding="utf-8"?>
+<p:notes xmlns:a="http://schemas.openxmlformats.org/drawingml/2006/main" xmlns:r="http://schemas.openxmlformats.org/officeDocument/2006/relationships" xmlns:p="http://schemas.openxmlformats.org/presentationml/2006/main">
+  <p:cSld>
+    <p:spTree>
+      <p:nvGrpSpPr>
+        <p:cNvPr id="1" name=""/>
+        <p:cNvGrpSpPr/>
+        <p:nvPr/>
+      </p:nvGrpSpPr>
+      <p:grpSpPr>
+        <a:xfrm>
+          <a:off x="0" y="0"/>
+          <a:ext cx="0" cy="0"/>
+          <a:chOff x="0" y="0"/>
+          <a:chExt cx="0" cy="0"/>
+        </a:xfrm>
+      </p:grpSpPr>
+      <p:sp>
+        <p:nvSpPr>
           <p:cNvPr id="163" name="Shape 163"/>
           <p:cNvSpPr>
             <a:spLocks noGrp="1" noRot="1" noChangeAspect="1"/>
@@ -578,10 +859,24 @@
               <a:defRPr u="none"/>
             </a:pPr>
             <a:r>
-              <a:rPr u="sng">
+              <a:rPr u="sng" dirty="0">
                 <a:hlinkClick r:id="rId3"/>
               </a:rPr>
               <a:t>https://filestore.aqa.org.uk/resources/computing/AQA-75162-75172-ALI.PDF</a:t>
+            </a:r>
+            <a:endParaRPr lang="en-GB" u="sng" dirty="0">
+              <a:hlinkClick r:id="rId3"/>
+            </a:endParaRPr>
+          </a:p>
+          <a:p>
+            <a:pPr>
+              <a:defRPr u="none"/>
+            </a:pPr>
+            <a:r>
+              <a:rPr lang="en-GB" u="sng" dirty="0">
+                <a:hlinkClick r:id="rId3"/>
+              </a:rPr>
+              <a:t>End – 11:00</a:t>
             </a:r>
           </a:p>
         </p:txBody>
@@ -594,7 +889,7 @@
 </p:notes>
 </file>
 
-<file path=ppt/notesSlides/notesSlide2.xml><?xml version="1.0" encoding="utf-8"?>
+<file path=ppt/notesSlides/notesSlide5.xml><?xml version="1.0" encoding="utf-8"?>
 <p:notes xmlns:a="http://schemas.openxmlformats.org/drawingml/2006/main" xmlns:r="http://schemas.openxmlformats.org/officeDocument/2006/relationships" xmlns:p="http://schemas.openxmlformats.org/presentationml/2006/main">
   <p:cSld>
     <p:spTree>
@@ -658,13 +953,10 @@
           <a:lstStyle/>
           <a:p>
             <a:r>
-              <a:t>IF 			-&gt; Go over general structure of IF Statements</a:t>
+              <a:rPr lang="en-GB" dirty="0"/>
+              <a:t>End - 11:05</a:t>
             </a:r>
-          </a:p>
-          <a:p>
-            <a:r>
-              <a:t>IF ELSE 	-&gt; Invite Student to write on the whiteboard a general assembly for IF ELSE</a:t>
-            </a:r>
+            <a:endParaRPr dirty="0"/>
           </a:p>
         </p:txBody>
       </p:sp>
@@ -676,7 +968,76 @@
 </p:notes>
 </file>
 
-<file path=ppt/notesSlides/notesSlide3.xml><?xml version="1.0" encoding="utf-8"?>
+<file path=ppt/notesSlides/notesSlide6.xml><?xml version="1.0" encoding="utf-8"?>
+<p:notes xmlns:a="http://schemas.openxmlformats.org/drawingml/2006/main" xmlns:r="http://schemas.openxmlformats.org/officeDocument/2006/relationships" xmlns:p="http://schemas.openxmlformats.org/presentationml/2006/main">
+  <p:cSld>
+    <p:spTree>
+      <p:nvGrpSpPr>
+        <p:cNvPr id="1" name=""/>
+        <p:cNvGrpSpPr/>
+        <p:nvPr/>
+      </p:nvGrpSpPr>
+      <p:grpSpPr>
+        <a:xfrm>
+          <a:off x="0" y="0"/>
+          <a:ext cx="0" cy="0"/>
+          <a:chOff x="0" y="0"/>
+          <a:chExt cx="0" cy="0"/>
+        </a:xfrm>
+      </p:grpSpPr>
+      <p:sp>
+        <p:nvSpPr>
+          <p:cNvPr id="2" name="Slide Image Placeholder 1"/>
+          <p:cNvSpPr>
+            <a:spLocks noGrp="1" noRot="1" noChangeAspect="1"/>
+          </p:cNvSpPr>
+          <p:nvPr>
+            <p:ph type="sldImg"/>
+          </p:nvPr>
+        </p:nvSpPr>
+        <p:spPr>
+          <a:xfrm>
+            <a:off x="381000" y="685800"/>
+            <a:ext cx="6096000" cy="3429000"/>
+          </a:xfrm>
+        </p:spPr>
+      </p:sp>
+      <p:sp>
+        <p:nvSpPr>
+          <p:cNvPr id="3" name="Notes Placeholder 2"/>
+          <p:cNvSpPr>
+            <a:spLocks noGrp="1"/>
+          </p:cNvSpPr>
+          <p:nvPr>
+            <p:ph type="body" idx="1"/>
+          </p:nvPr>
+        </p:nvSpPr>
+        <p:spPr/>
+        <p:txBody>
+          <a:bodyPr/>
+          <a:lstStyle/>
+          <a:p>
+            <a:r>
+              <a:rPr lang="en-US" dirty="0"/>
+              <a:t>End – 11:10</a:t>
+            </a:r>
+          </a:p>
+        </p:txBody>
+      </p:sp>
+    </p:spTree>
+    <p:extLst>
+      <p:ext uri="{BB962C8B-B14F-4D97-AF65-F5344CB8AC3E}">
+        <p14:creationId xmlns:p14="http://schemas.microsoft.com/office/powerpoint/2010/main" val="2886040463"/>
+      </p:ext>
+    </p:extLst>
+  </p:cSld>
+  <p:clrMapOvr>
+    <a:masterClrMapping/>
+  </p:clrMapOvr>
+</p:notes>
+</file>
+
+<file path=ppt/notesSlides/notesSlide7.xml><?xml version="1.0" encoding="utf-8"?>
 <p:notes xmlns:a="http://schemas.openxmlformats.org/drawingml/2006/main" xmlns:r="http://schemas.openxmlformats.org/officeDocument/2006/relationships" xmlns:p="http://schemas.openxmlformats.org/presentationml/2006/main">
   <p:cSld>
     <p:spTree>
@@ -753,6 +1114,16 @@
               <a:buFontTx/>
               <a:buChar char="-"/>
             </a:pPr>
+            <a:r>
+              <a:rPr lang="en-GB" dirty="0"/>
+              <a:t>End – 11:15</a:t>
+            </a:r>
+          </a:p>
+          <a:p>
+            <a:pPr marL="342900" indent="-342900">
+              <a:buFontTx/>
+              <a:buChar char="-"/>
+            </a:pPr>
             <a:endParaRPr dirty="0"/>
           </a:p>
         </p:txBody>
@@ -765,7 +1136,7 @@
 </p:notes>
 </file>
 
-<file path=ppt/notesSlides/notesSlide4.xml><?xml version="1.0" encoding="utf-8"?>
+<file path=ppt/notesSlides/notesSlide8.xml><?xml version="1.0" encoding="utf-8"?>
 <p:notes xmlns:a="http://schemas.openxmlformats.org/drawingml/2006/main" xmlns:r="http://schemas.openxmlformats.org/officeDocument/2006/relationships" xmlns:p="http://schemas.openxmlformats.org/presentationml/2006/main">
   <p:cSld>
     <p:spTree>
@@ -829,12 +1200,83 @@
           <a:lstStyle/>
           <a:p>
             <a:r>
-              <a:t>IF Example -&gt; </a:t>
+              <a:rPr lang="en-GB" dirty="0"/>
+              <a:t>End – 11:20</a:t>
             </a:r>
+            <a:endParaRPr dirty="0"/>
           </a:p>
         </p:txBody>
       </p:sp>
     </p:spTree>
+  </p:cSld>
+  <p:clrMapOvr>
+    <a:masterClrMapping/>
+  </p:clrMapOvr>
+</p:notes>
+</file>
+
+<file path=ppt/notesSlides/notesSlide9.xml><?xml version="1.0" encoding="utf-8"?>
+<p:notes xmlns:a="http://schemas.openxmlformats.org/drawingml/2006/main" xmlns:r="http://schemas.openxmlformats.org/officeDocument/2006/relationships" xmlns:p="http://schemas.openxmlformats.org/presentationml/2006/main">
+  <p:cSld>
+    <p:spTree>
+      <p:nvGrpSpPr>
+        <p:cNvPr id="1" name=""/>
+        <p:cNvGrpSpPr/>
+        <p:nvPr/>
+      </p:nvGrpSpPr>
+      <p:grpSpPr>
+        <a:xfrm>
+          <a:off x="0" y="0"/>
+          <a:ext cx="0" cy="0"/>
+          <a:chOff x="0" y="0"/>
+          <a:chExt cx="0" cy="0"/>
+        </a:xfrm>
+      </p:grpSpPr>
+      <p:sp>
+        <p:nvSpPr>
+          <p:cNvPr id="2" name="Slide Image Placeholder 1"/>
+          <p:cNvSpPr>
+            <a:spLocks noGrp="1" noRot="1" noChangeAspect="1"/>
+          </p:cNvSpPr>
+          <p:nvPr>
+            <p:ph type="sldImg"/>
+          </p:nvPr>
+        </p:nvSpPr>
+        <p:spPr>
+          <a:xfrm>
+            <a:off x="381000" y="685800"/>
+            <a:ext cx="6096000" cy="3429000"/>
+          </a:xfrm>
+        </p:spPr>
+      </p:sp>
+      <p:sp>
+        <p:nvSpPr>
+          <p:cNvPr id="3" name="Notes Placeholder 2"/>
+          <p:cNvSpPr>
+            <a:spLocks noGrp="1"/>
+          </p:cNvSpPr>
+          <p:nvPr>
+            <p:ph type="body" idx="1"/>
+          </p:nvPr>
+        </p:nvSpPr>
+        <p:spPr/>
+        <p:txBody>
+          <a:bodyPr/>
+          <a:lstStyle/>
+          <a:p>
+            <a:r>
+              <a:rPr lang="en-US" dirty="0"/>
+              <a:t>End – 11:25</a:t>
+            </a:r>
+          </a:p>
+        </p:txBody>
+      </p:sp>
+    </p:spTree>
+    <p:extLst>
+      <p:ext uri="{BB962C8B-B14F-4D97-AF65-F5344CB8AC3E}">
+        <p14:creationId xmlns:p14="http://schemas.microsoft.com/office/powerpoint/2010/main" val="788630664"/>
+      </p:ext>
+    </p:extLst>
   </p:cSld>
   <p:clrMapOvr>
     <a:masterClrMapping/>
@@ -3630,7 +4072,7 @@
           </a:ln>
           <a:extLst>
             <a:ext uri="{C572A759-6A51-4108-AA02-DFA0A04FC94B}">
-              <ma14:wrappingTextBoxFlag xmlns:ma14="http://schemas.microsoft.com/office/mac/drawingml/2011/main" xmlns:a14="http://schemas.microsoft.com/office/drawing/2010/main" xmlns:m="http://schemas.openxmlformats.org/officeDocument/2006/math" xmlns="" val="1"/>
+              <ma14:wrappingTextBoxFlag xmlns="" xmlns:m="http://schemas.openxmlformats.org/officeDocument/2006/math" xmlns:a14="http://schemas.microsoft.com/office/drawing/2010/main" xmlns:ma14="http://schemas.microsoft.com/office/mac/drawingml/2011/main" val="1"/>
             </a:ext>
           </a:extLst>
         </p:spPr>
@@ -3685,7 +4127,7 @@
           </a:ln>
           <a:extLst>
             <a:ext uri="{C572A759-6A51-4108-AA02-DFA0A04FC94B}">
-              <ma14:wrappingTextBoxFlag xmlns:ma14="http://schemas.microsoft.com/office/mac/drawingml/2011/main" xmlns:a14="http://schemas.microsoft.com/office/drawing/2010/main" xmlns:m="http://schemas.openxmlformats.org/officeDocument/2006/math" xmlns="" val="1"/>
+              <ma14:wrappingTextBoxFlag xmlns="" xmlns:m="http://schemas.openxmlformats.org/officeDocument/2006/math" xmlns:a14="http://schemas.microsoft.com/office/drawing/2010/main" xmlns:ma14="http://schemas.microsoft.com/office/mac/drawingml/2011/main" val="1"/>
             </a:ext>
           </a:extLst>
         </p:spPr>
@@ -4702,7 +5144,7 @@
           <p:nvPr/>
         </p:nvPicPr>
         <p:blipFill>
-          <a:blip r:embed="rId2"/>
+          <a:blip r:embed="rId3"/>
           <a:stretch>
             <a:fillRect/>
           </a:stretch>
@@ -4739,7 +5181,7 @@
           </a:ln>
           <a:extLst>
             <a:ext uri="{C572A759-6A51-4108-AA02-DFA0A04FC94B}">
-              <ma14:wrappingTextBoxFlag xmlns:ma14="http://schemas.microsoft.com/office/mac/drawingml/2011/main" xmlns:a14="http://schemas.microsoft.com/office/drawing/2010/main" xmlns:m="http://schemas.openxmlformats.org/officeDocument/2006/math" xmlns="" val="1"/>
+              <ma14:wrappingTextBoxFlag xmlns="" xmlns:m="http://schemas.openxmlformats.org/officeDocument/2006/math" xmlns:a14="http://schemas.microsoft.com/office/drawing/2010/main" xmlns:ma14="http://schemas.microsoft.com/office/mac/drawingml/2011/main" val="1"/>
             </a:ext>
           </a:extLst>
         </p:spPr>
@@ -5025,7 +5467,7 @@
           </a:prstGeom>
           <a:extLst>
             <a:ext uri="{C572A759-6A51-4108-AA02-DFA0A04FC94B}">
-              <ma14:wrappingTextBoxFlag xmlns:ma14="http://schemas.microsoft.com/office/mac/drawingml/2011/main" xmlns:a14="http://schemas.microsoft.com/office/drawing/2010/main" xmlns:m="http://schemas.openxmlformats.org/officeDocument/2006/math" xmlns="" val="1"/>
+              <ma14:wrappingTextBoxFlag xmlns="" xmlns:m="http://schemas.openxmlformats.org/officeDocument/2006/math" xmlns:a14="http://schemas.microsoft.com/office/drawing/2010/main" xmlns:ma14="http://schemas.microsoft.com/office/mac/drawingml/2011/main" val="1"/>
             </a:ext>
           </a:extLst>
         </p:spPr>
@@ -5082,7 +5524,7 @@
           </a:ln>
           <a:extLst>
             <a:ext uri="{C572A759-6A51-4108-AA02-DFA0A04FC94B}">
-              <ma14:wrappingTextBoxFlag xmlns:ma14="http://schemas.microsoft.com/office/mac/drawingml/2011/main" xmlns:a14="http://schemas.microsoft.com/office/drawing/2010/main" xmlns:m="http://schemas.openxmlformats.org/officeDocument/2006/math" xmlns="" val="1"/>
+              <ma14:wrappingTextBoxFlag xmlns="" xmlns:m="http://schemas.openxmlformats.org/officeDocument/2006/math" xmlns:a14="http://schemas.microsoft.com/office/drawing/2010/main" xmlns:ma14="http://schemas.microsoft.com/office/mac/drawingml/2011/main" val="1"/>
             </a:ext>
           </a:extLst>
         </p:spPr>
@@ -5478,7 +5920,7 @@
           <p:nvPr/>
         </p:nvPicPr>
         <p:blipFill>
-          <a:blip r:embed="rId2"/>
+          <a:blip r:embed="rId3"/>
           <a:stretch>
             <a:fillRect/>
           </a:stretch>
@@ -5715,7 +6157,7 @@
           </a:ln>
           <a:extLst>
             <a:ext uri="{C572A759-6A51-4108-AA02-DFA0A04FC94B}">
-              <ma14:wrappingTextBoxFlag xmlns:ma14="http://schemas.microsoft.com/office/mac/drawingml/2011/main" xmlns:a14="http://schemas.microsoft.com/office/drawing/2010/main" xmlns:m="http://schemas.openxmlformats.org/officeDocument/2006/math" xmlns="" val="1"/>
+              <ma14:wrappingTextBoxFlag xmlns="" xmlns:m="http://schemas.openxmlformats.org/officeDocument/2006/math" xmlns:a14="http://schemas.microsoft.com/office/drawing/2010/main" xmlns:ma14="http://schemas.microsoft.com/office/mac/drawingml/2011/main" val="1"/>
             </a:ext>
           </a:extLst>
         </p:spPr>
@@ -5864,7 +6306,7 @@
             </a:ln>
             <a:extLst>
               <a:ext uri="{C572A759-6A51-4108-AA02-DFA0A04FC94B}">
-                <ma14:wrappingTextBoxFlag xmlns:ma14="http://schemas.microsoft.com/office/mac/drawingml/2011/main" xmlns:a14="http://schemas.microsoft.com/office/drawing/2010/main" xmlns:m="http://schemas.openxmlformats.org/officeDocument/2006/math" xmlns="" val="1"/>
+                <ma14:wrappingTextBoxFlag xmlns="" xmlns:m="http://schemas.openxmlformats.org/officeDocument/2006/math" xmlns:a14="http://schemas.microsoft.com/office/drawing/2010/main" xmlns:ma14="http://schemas.microsoft.com/office/mac/drawingml/2011/main" val="1"/>
               </a:ext>
             </a:extLst>
           </p:spPr>
@@ -5915,7 +6357,7 @@
             </a:ln>
             <a:extLst>
               <a:ext uri="{C572A759-6A51-4108-AA02-DFA0A04FC94B}">
-                <ma14:wrappingTextBoxFlag xmlns:ma14="http://schemas.microsoft.com/office/mac/drawingml/2011/main" xmlns:a14="http://schemas.microsoft.com/office/drawing/2010/main" xmlns:m="http://schemas.openxmlformats.org/officeDocument/2006/math" xmlns="" val="1"/>
+                <ma14:wrappingTextBoxFlag xmlns="" xmlns:m="http://schemas.openxmlformats.org/officeDocument/2006/math" xmlns:a14="http://schemas.microsoft.com/office/drawing/2010/main" xmlns:ma14="http://schemas.microsoft.com/office/mac/drawingml/2011/main" val="1"/>
               </a:ext>
             </a:extLst>
           </p:spPr>
@@ -6048,7 +6490,7 @@
             </a:ln>
             <a:extLst>
               <a:ext uri="{C572A759-6A51-4108-AA02-DFA0A04FC94B}">
-                <ma14:wrappingTextBoxFlag xmlns:ma14="http://schemas.microsoft.com/office/mac/drawingml/2011/main" xmlns:a14="http://schemas.microsoft.com/office/drawing/2010/main" xmlns:m="http://schemas.openxmlformats.org/officeDocument/2006/math" xmlns="" val="1"/>
+                <ma14:wrappingTextBoxFlag xmlns="" xmlns:m="http://schemas.openxmlformats.org/officeDocument/2006/math" xmlns:a14="http://schemas.microsoft.com/office/drawing/2010/main" xmlns:ma14="http://schemas.microsoft.com/office/mac/drawingml/2011/main" val="1"/>
               </a:ext>
             </a:extLst>
           </p:spPr>
@@ -6450,7 +6892,7 @@
           </a:ln>
           <a:extLst>
             <a:ext uri="{C572A759-6A51-4108-AA02-DFA0A04FC94B}">
-              <ma14:wrappingTextBoxFlag xmlns:ma14="http://schemas.microsoft.com/office/mac/drawingml/2011/main" xmlns:a14="http://schemas.microsoft.com/office/drawing/2010/main" xmlns:m="http://schemas.openxmlformats.org/officeDocument/2006/math" xmlns="" val="1"/>
+              <ma14:wrappingTextBoxFlag xmlns="" xmlns:m="http://schemas.openxmlformats.org/officeDocument/2006/math" xmlns:a14="http://schemas.microsoft.com/office/drawing/2010/main" xmlns:ma14="http://schemas.microsoft.com/office/mac/drawingml/2011/main" val="1"/>
             </a:ext>
           </a:extLst>
         </p:spPr>
@@ -6550,7 +6992,7 @@
           </a:ln>
           <a:extLst>
             <a:ext uri="{C572A759-6A51-4108-AA02-DFA0A04FC94B}">
-              <ma14:wrappingTextBoxFlag xmlns:ma14="http://schemas.microsoft.com/office/mac/drawingml/2011/main" xmlns:a14="http://schemas.microsoft.com/office/drawing/2010/main" xmlns:m="http://schemas.openxmlformats.org/officeDocument/2006/math" xmlns="" val="1"/>
+              <ma14:wrappingTextBoxFlag xmlns="" xmlns:m="http://schemas.openxmlformats.org/officeDocument/2006/math" xmlns:a14="http://schemas.microsoft.com/office/drawing/2010/main" xmlns:ma14="http://schemas.microsoft.com/office/mac/drawingml/2011/main" val="1"/>
             </a:ext>
           </a:extLst>
         </p:spPr>
@@ -6634,7 +7076,7 @@
           </a:ln>
           <a:extLst>
             <a:ext uri="{C572A759-6A51-4108-AA02-DFA0A04FC94B}">
-              <ma14:wrappingTextBoxFlag xmlns:ma14="http://schemas.microsoft.com/office/mac/drawingml/2011/main" xmlns:a14="http://schemas.microsoft.com/office/drawing/2010/main" xmlns:m="http://schemas.openxmlformats.org/officeDocument/2006/math" xmlns="" val="1"/>
+              <ma14:wrappingTextBoxFlag xmlns="" xmlns:m="http://schemas.openxmlformats.org/officeDocument/2006/math" xmlns:a14="http://schemas.microsoft.com/office/drawing/2010/main" xmlns:ma14="http://schemas.microsoft.com/office/mac/drawingml/2011/main" val="1"/>
             </a:ext>
           </a:extLst>
         </p:spPr>
@@ -6999,7 +7441,7 @@
           </a:ln>
           <a:extLst>
             <a:ext uri="{C572A759-6A51-4108-AA02-DFA0A04FC94B}">
-              <ma14:wrappingTextBoxFlag xmlns:ma14="http://schemas.microsoft.com/office/mac/drawingml/2011/main" xmlns:a14="http://schemas.microsoft.com/office/drawing/2010/main" xmlns:m="http://schemas.openxmlformats.org/officeDocument/2006/math" xmlns="" val="1"/>
+              <ma14:wrappingTextBoxFlag xmlns="" xmlns:m="http://schemas.openxmlformats.org/officeDocument/2006/math" xmlns:a14="http://schemas.microsoft.com/office/drawing/2010/main" xmlns:ma14="http://schemas.microsoft.com/office/mac/drawingml/2011/main" val="1"/>
             </a:ext>
           </a:extLst>
         </p:spPr>
@@ -7101,7 +7543,7 @@
           </a:ln>
           <a:extLst>
             <a:ext uri="{C572A759-6A51-4108-AA02-DFA0A04FC94B}">
-              <ma14:wrappingTextBoxFlag xmlns:ma14="http://schemas.microsoft.com/office/mac/drawingml/2011/main" xmlns:a14="http://schemas.microsoft.com/office/drawing/2010/main" xmlns:m="http://schemas.openxmlformats.org/officeDocument/2006/math" xmlns="" val="1"/>
+              <ma14:wrappingTextBoxFlag xmlns="" xmlns:m="http://schemas.openxmlformats.org/officeDocument/2006/math" xmlns:a14="http://schemas.microsoft.com/office/drawing/2010/main" xmlns:ma14="http://schemas.microsoft.com/office/mac/drawingml/2011/main" val="1"/>
             </a:ext>
           </a:extLst>
         </p:spPr>
@@ -7179,7 +7621,7 @@
             </a:ln>
             <a:extLst>
               <a:ext uri="{C572A759-6A51-4108-AA02-DFA0A04FC94B}">
-                <ma14:wrappingTextBoxFlag xmlns:ma14="http://schemas.microsoft.com/office/mac/drawingml/2011/main" xmlns:a14="http://schemas.microsoft.com/office/drawing/2010/main" xmlns:m="http://schemas.openxmlformats.org/officeDocument/2006/math" xmlns="" val="1"/>
+                <ma14:wrappingTextBoxFlag xmlns="" xmlns:m="http://schemas.openxmlformats.org/officeDocument/2006/math" xmlns:a14="http://schemas.microsoft.com/office/drawing/2010/main" xmlns:ma14="http://schemas.microsoft.com/office/mac/drawingml/2011/main" val="1"/>
               </a:ext>
             </a:extLst>
           </p:spPr>
@@ -7468,7 +7910,7 @@
             </a:ln>
             <a:extLst>
               <a:ext uri="{C572A759-6A51-4108-AA02-DFA0A04FC94B}">
-                <ma14:wrappingTextBoxFlag xmlns:ma14="http://schemas.microsoft.com/office/mac/drawingml/2011/main" xmlns:a14="http://schemas.microsoft.com/office/drawing/2010/main" xmlns:m="http://schemas.openxmlformats.org/officeDocument/2006/math" xmlns="" val="1"/>
+                <ma14:wrappingTextBoxFlag xmlns="" xmlns:m="http://schemas.openxmlformats.org/officeDocument/2006/math" xmlns:a14="http://schemas.microsoft.com/office/drawing/2010/main" xmlns:ma14="http://schemas.microsoft.com/office/mac/drawingml/2011/main" val="1"/>
               </a:ext>
             </a:extLst>
           </p:spPr>
@@ -7916,7 +8358,7 @@
           </a:ln>
           <a:extLst>
             <a:ext uri="{C572A759-6A51-4108-AA02-DFA0A04FC94B}">
-              <ma14:wrappingTextBoxFlag xmlns:ma14="http://schemas.microsoft.com/office/mac/drawingml/2011/main" xmlns:a14="http://schemas.microsoft.com/office/drawing/2010/main" xmlns:m="http://schemas.openxmlformats.org/officeDocument/2006/math" xmlns="" val="1"/>
+              <ma14:wrappingTextBoxFlag xmlns="" xmlns:m="http://schemas.openxmlformats.org/officeDocument/2006/math" xmlns:a14="http://schemas.microsoft.com/office/drawing/2010/main" xmlns:ma14="http://schemas.microsoft.com/office/mac/drawingml/2011/main" val="1"/>
             </a:ext>
           </a:extLst>
         </p:spPr>
@@ -8002,7 +8444,7 @@
           </a:ln>
           <a:extLst>
             <a:ext uri="{C572A759-6A51-4108-AA02-DFA0A04FC94B}">
-              <ma14:wrappingTextBoxFlag xmlns:ma14="http://schemas.microsoft.com/office/mac/drawingml/2011/main" xmlns:a14="http://schemas.microsoft.com/office/drawing/2010/main" xmlns:m="http://schemas.openxmlformats.org/officeDocument/2006/math" xmlns="" val="1"/>
+              <ma14:wrappingTextBoxFlag xmlns="" xmlns:m="http://schemas.openxmlformats.org/officeDocument/2006/math" xmlns:a14="http://schemas.microsoft.com/office/drawing/2010/main" xmlns:ma14="http://schemas.microsoft.com/office/mac/drawingml/2011/main" val="1"/>
             </a:ext>
           </a:extLst>
         </p:spPr>
@@ -8159,7 +8601,7 @@
             </a:ln>
             <a:extLst>
               <a:ext uri="{C572A759-6A51-4108-AA02-DFA0A04FC94B}">
-                <ma14:wrappingTextBoxFlag xmlns:ma14="http://schemas.microsoft.com/office/mac/drawingml/2011/main" xmlns:a14="http://schemas.microsoft.com/office/drawing/2010/main" xmlns:m="http://schemas.openxmlformats.org/officeDocument/2006/math" xmlns="" val="1"/>
+                <ma14:wrappingTextBoxFlag xmlns="" xmlns:m="http://schemas.openxmlformats.org/officeDocument/2006/math" xmlns:a14="http://schemas.microsoft.com/office/drawing/2010/main" xmlns:ma14="http://schemas.microsoft.com/office/mac/drawingml/2011/main" val="1"/>
               </a:ext>
             </a:extLst>
           </p:spPr>
@@ -8490,7 +8932,7 @@
           <p:nvPr/>
         </p:nvPicPr>
         <p:blipFill>
-          <a:blip r:embed="rId2"/>
+          <a:blip r:embed="rId3"/>
           <a:stretch>
             <a:fillRect/>
           </a:stretch>

</xml_diff>